<commit_message>
ENH: updated org chart
Updated org chart by adding web support and a date to the names version.
</commit_message>
<xml_diff>
--- a/Organization/ELSP_Org_Chart.pptx
+++ b/Organization/ELSP_Org_Chart.pptx
@@ -105,6 +105,11 @@
       </a:defRPr>
     </a:lvl9pPr>
   </p:defaultTextStyle>
+  <p:extLst>
+    <p:ext uri="{EFAFB233-063F-42B5-8137-9DF3F51BA10A}">
+      <p15:sldGuideLst xmlns:p15="http://schemas.microsoft.com/office/powerpoint/2012/main"/>
+    </p:ext>
+  </p:extLst>
 </p:presentation>
 </file>
 
@@ -255,7 +260,7 @@
           <a:p>
             <a:fld id="{7BD94A7E-3487-DB46-9018-185DFFE5DEF3}" type="datetimeFigureOut">
               <a:rPr lang="en-US" smtClean="0"/>
-              <a:t>2/11/21</a:t>
+              <a:t>2/12/21</a:t>
             </a:fld>
             <a:endParaRPr lang="en-US"/>
           </a:p>
@@ -453,7 +458,7 @@
           <a:p>
             <a:fld id="{7BD94A7E-3487-DB46-9018-185DFFE5DEF3}" type="datetimeFigureOut">
               <a:rPr lang="en-US" smtClean="0"/>
-              <a:t>2/11/21</a:t>
+              <a:t>2/12/21</a:t>
             </a:fld>
             <a:endParaRPr lang="en-US"/>
           </a:p>
@@ -661,7 +666,7 @@
           <a:p>
             <a:fld id="{7BD94A7E-3487-DB46-9018-185DFFE5DEF3}" type="datetimeFigureOut">
               <a:rPr lang="en-US" smtClean="0"/>
-              <a:t>2/11/21</a:t>
+              <a:t>2/12/21</a:t>
             </a:fld>
             <a:endParaRPr lang="en-US"/>
           </a:p>
@@ -859,7 +864,7 @@
           <a:p>
             <a:fld id="{7BD94A7E-3487-DB46-9018-185DFFE5DEF3}" type="datetimeFigureOut">
               <a:rPr lang="en-US" smtClean="0"/>
-              <a:t>2/11/21</a:t>
+              <a:t>2/12/21</a:t>
             </a:fld>
             <a:endParaRPr lang="en-US"/>
           </a:p>
@@ -1134,7 +1139,7 @@
           <a:p>
             <a:fld id="{7BD94A7E-3487-DB46-9018-185DFFE5DEF3}" type="datetimeFigureOut">
               <a:rPr lang="en-US" smtClean="0"/>
-              <a:t>2/11/21</a:t>
+              <a:t>2/12/21</a:t>
             </a:fld>
             <a:endParaRPr lang="en-US"/>
           </a:p>
@@ -1399,7 +1404,7 @@
           <a:p>
             <a:fld id="{7BD94A7E-3487-DB46-9018-185DFFE5DEF3}" type="datetimeFigureOut">
               <a:rPr lang="en-US" smtClean="0"/>
-              <a:t>2/11/21</a:t>
+              <a:t>2/12/21</a:t>
             </a:fld>
             <a:endParaRPr lang="en-US"/>
           </a:p>
@@ -1811,7 +1816,7 @@
           <a:p>
             <a:fld id="{7BD94A7E-3487-DB46-9018-185DFFE5DEF3}" type="datetimeFigureOut">
               <a:rPr lang="en-US" smtClean="0"/>
-              <a:t>2/11/21</a:t>
+              <a:t>2/12/21</a:t>
             </a:fld>
             <a:endParaRPr lang="en-US"/>
           </a:p>
@@ -1952,7 +1957,7 @@
           <a:p>
             <a:fld id="{7BD94A7E-3487-DB46-9018-185DFFE5DEF3}" type="datetimeFigureOut">
               <a:rPr lang="en-US" smtClean="0"/>
-              <a:t>2/11/21</a:t>
+              <a:t>2/12/21</a:t>
             </a:fld>
             <a:endParaRPr lang="en-US"/>
           </a:p>
@@ -2065,7 +2070,7 @@
           <a:p>
             <a:fld id="{7BD94A7E-3487-DB46-9018-185DFFE5DEF3}" type="datetimeFigureOut">
               <a:rPr lang="en-US" smtClean="0"/>
-              <a:t>2/11/21</a:t>
+              <a:t>2/12/21</a:t>
             </a:fld>
             <a:endParaRPr lang="en-US"/>
           </a:p>
@@ -2376,7 +2381,7 @@
           <a:p>
             <a:fld id="{7BD94A7E-3487-DB46-9018-185DFFE5DEF3}" type="datetimeFigureOut">
               <a:rPr lang="en-US" smtClean="0"/>
-              <a:t>2/11/21</a:t>
+              <a:t>2/12/21</a:t>
             </a:fld>
             <a:endParaRPr lang="en-US"/>
           </a:p>
@@ -2664,7 +2669,7 @@
           <a:p>
             <a:fld id="{7BD94A7E-3487-DB46-9018-185DFFE5DEF3}" type="datetimeFigureOut">
               <a:rPr lang="en-US" smtClean="0"/>
-              <a:t>2/11/21</a:t>
+              <a:t>2/12/21</a:t>
             </a:fld>
             <a:endParaRPr lang="en-US"/>
           </a:p>
@@ -2905,7 +2910,7 @@
           <a:p>
             <a:fld id="{7BD94A7E-3487-DB46-9018-185DFFE5DEF3}" type="datetimeFigureOut">
               <a:rPr lang="en-US" smtClean="0"/>
-              <a:t>2/11/21</a:t>
+              <a:t>2/12/21</a:t>
             </a:fld>
             <a:endParaRPr lang="en-US"/>
           </a:p>
@@ -3381,7 +3386,7 @@
         <p:spPr>
           <a:xfrm>
             <a:off x="2517569" y="2240475"/>
-            <a:ext cx="2351314" cy="3897087"/>
+            <a:ext cx="2351314" cy="2699659"/>
           </a:xfrm>
           <a:prstGeom prst="roundRect">
             <a:avLst>
@@ -3897,6 +3902,108 @@
           </a:p>
         </p:txBody>
       </p:sp>
+      <p:sp>
+        <p:nvSpPr>
+          <p:cNvPr id="14" name="Rounded Rectangle 13">
+            <a:extLst>
+              <a:ext uri="{FF2B5EF4-FFF2-40B4-BE49-F238E27FC236}">
+                <a16:creationId xmlns:a16="http://schemas.microsoft.com/office/drawing/2014/main" id="{0E837AB6-22A1-A441-97E4-FDAD00B0413F}"/>
+              </a:ext>
+            </a:extLst>
+          </p:cNvPr>
+          <p:cNvSpPr/>
+          <p:nvPr/>
+        </p:nvSpPr>
+        <p:spPr>
+          <a:xfrm>
+            <a:off x="2517569" y="5043053"/>
+            <a:ext cx="2351314" cy="1094509"/>
+          </a:xfrm>
+          <a:prstGeom prst="roundRect">
+            <a:avLst>
+              <a:gd name="adj" fmla="val 17128"/>
+            </a:avLst>
+          </a:prstGeom>
+          <a:solidFill>
+            <a:srgbClr val="546AB7"/>
+          </a:solidFill>
+          <a:ln>
+            <a:noFill/>
+          </a:ln>
+        </p:spPr>
+        <p:style>
+          <a:lnRef idx="2">
+            <a:schemeClr val="accent1">
+              <a:shade val="50000"/>
+            </a:schemeClr>
+          </a:lnRef>
+          <a:fillRef idx="1">
+            <a:schemeClr val="accent1"/>
+          </a:fillRef>
+          <a:effectRef idx="0">
+            <a:schemeClr val="accent1"/>
+          </a:effectRef>
+          <a:fontRef idx="minor">
+            <a:schemeClr val="lt1"/>
+          </a:fontRef>
+        </p:style>
+        <p:txBody>
+          <a:bodyPr rtlCol="0" anchor="ctr"/>
+          <a:lstStyle/>
+          <a:p>
+            <a:pPr algn="ctr"/>
+            <a:r>
+              <a:rPr lang="en-US" b="1" dirty="0"/>
+              <a:t>Web Development and Support</a:t>
+            </a:r>
+          </a:p>
+        </p:txBody>
+      </p:sp>
+      <p:cxnSp>
+        <p:nvCxnSpPr>
+          <p:cNvPr id="16" name="Straight Connector 15">
+            <a:extLst>
+              <a:ext uri="{FF2B5EF4-FFF2-40B4-BE49-F238E27FC236}">
+                <a16:creationId xmlns:a16="http://schemas.microsoft.com/office/drawing/2014/main" id="{04F6BD78-294C-C044-88E9-9669A174005D}"/>
+              </a:ext>
+            </a:extLst>
+          </p:cNvPr>
+          <p:cNvCxnSpPr>
+            <a:cxnSpLocks/>
+            <a:stCxn id="6" idx="2"/>
+            <a:endCxn id="14" idx="0"/>
+          </p:cNvCxnSpPr>
+          <p:nvPr/>
+        </p:nvCxnSpPr>
+        <p:spPr>
+          <a:xfrm>
+            <a:off x="3693226" y="4940134"/>
+            <a:ext cx="0" cy="102919"/>
+          </a:xfrm>
+          <a:prstGeom prst="line">
+            <a:avLst/>
+          </a:prstGeom>
+          <a:ln w="76200">
+            <a:solidFill>
+              <a:schemeClr val="tx1"/>
+            </a:solidFill>
+          </a:ln>
+        </p:spPr>
+        <p:style>
+          <a:lnRef idx="1">
+            <a:schemeClr val="accent1"/>
+          </a:lnRef>
+          <a:fillRef idx="0">
+            <a:schemeClr val="accent1"/>
+          </a:fillRef>
+          <a:effectRef idx="0">
+            <a:schemeClr val="accent1"/>
+          </a:effectRef>
+          <a:fontRef idx="minor">
+            <a:schemeClr val="tx1"/>
+          </a:fontRef>
+        </p:style>
+      </p:cxnSp>
     </p:spTree>
     <p:extLst>
       <p:ext uri="{BB962C8B-B14F-4D97-AF65-F5344CB8AC3E}">
@@ -3927,6 +4034,74 @@
           <a:chExt cx="0" cy="0"/>
         </a:xfrm>
       </p:grpSpPr>
+      <p:sp>
+        <p:nvSpPr>
+          <p:cNvPr id="16" name="Rounded Rectangle 15">
+            <a:extLst>
+              <a:ext uri="{FF2B5EF4-FFF2-40B4-BE49-F238E27FC236}">
+                <a16:creationId xmlns:a16="http://schemas.microsoft.com/office/drawing/2014/main" id="{7201DE3C-2E6A-824E-BEC7-CEA64066ADD1}"/>
+              </a:ext>
+            </a:extLst>
+          </p:cNvPr>
+          <p:cNvSpPr/>
+          <p:nvPr/>
+        </p:nvSpPr>
+        <p:spPr>
+          <a:xfrm>
+            <a:off x="2517569" y="5043053"/>
+            <a:ext cx="2351314" cy="1094509"/>
+          </a:xfrm>
+          <a:prstGeom prst="roundRect">
+            <a:avLst>
+              <a:gd name="adj" fmla="val 17128"/>
+            </a:avLst>
+          </a:prstGeom>
+          <a:solidFill>
+            <a:srgbClr val="546AB7"/>
+          </a:solidFill>
+          <a:ln>
+            <a:noFill/>
+          </a:ln>
+        </p:spPr>
+        <p:style>
+          <a:lnRef idx="2">
+            <a:schemeClr val="accent1">
+              <a:shade val="50000"/>
+            </a:schemeClr>
+          </a:lnRef>
+          <a:fillRef idx="1">
+            <a:schemeClr val="accent1"/>
+          </a:fillRef>
+          <a:effectRef idx="0">
+            <a:schemeClr val="accent1"/>
+          </a:effectRef>
+          <a:fontRef idx="minor">
+            <a:schemeClr val="lt1"/>
+          </a:fontRef>
+        </p:style>
+        <p:txBody>
+          <a:bodyPr rtlCol="0" anchor="ctr"/>
+          <a:lstStyle/>
+          <a:p>
+            <a:pPr algn="ctr"/>
+            <a:r>
+              <a:rPr lang="en-US" b="1" dirty="0"/>
+              <a:t>Web Development and Support</a:t>
+            </a:r>
+          </a:p>
+          <a:p>
+            <a:pPr algn="ctr"/>
+            <a:endParaRPr lang="en-US" sz="800" b="1" dirty="0"/>
+          </a:p>
+          <a:p>
+            <a:pPr algn="ctr"/>
+            <a:r>
+              <a:rPr lang="en-US" dirty="0"/>
+              <a:t>Melissa Smith</a:t>
+            </a:r>
+          </a:p>
+        </p:txBody>
+      </p:sp>
       <p:cxnSp>
         <p:nvCxnSpPr>
           <p:cNvPr id="12" name="Straight Connector 11">
@@ -3985,8 +4160,8 @@
         </p:nvSpPr>
         <p:spPr>
           <a:xfrm>
-            <a:off x="2517569" y="2240475"/>
-            <a:ext cx="2351314" cy="3897087"/>
+            <a:off x="2517569" y="2240476"/>
+            <a:ext cx="2351314" cy="2699659"/>
           </a:xfrm>
           <a:prstGeom prst="roundRect">
             <a:avLst>
@@ -4028,7 +4203,7 @@
           </a:p>
           <a:p>
             <a:pPr algn="ctr"/>
-            <a:endParaRPr lang="en-US" b="1" dirty="0"/>
+            <a:endParaRPr lang="en-US" sz="800" b="1" dirty="0"/>
           </a:p>
           <a:p>
             <a:pPr algn="ctr"/>
@@ -4417,7 +4592,7 @@
         <p:spPr>
           <a:xfrm>
             <a:off x="3693226" y="2137559"/>
-            <a:ext cx="0" cy="102916"/>
+            <a:ext cx="0" cy="102917"/>
           </a:xfrm>
           <a:prstGeom prst="line">
             <a:avLst/>
@@ -4548,6 +4723,87 @@
           </a:p>
         </p:txBody>
       </p:sp>
+      <p:sp>
+        <p:nvSpPr>
+          <p:cNvPr id="2" name="TextBox 1">
+            <a:extLst>
+              <a:ext uri="{FF2B5EF4-FFF2-40B4-BE49-F238E27FC236}">
+                <a16:creationId xmlns:a16="http://schemas.microsoft.com/office/drawing/2014/main" id="{93AA85C1-12FF-D44A-9A74-6ACF6B4EAE33}"/>
+              </a:ext>
+            </a:extLst>
+          </p:cNvPr>
+          <p:cNvSpPr txBox="1"/>
+          <p:nvPr/>
+        </p:nvSpPr>
+        <p:spPr>
+          <a:xfrm>
+            <a:off x="7220197" y="6240478"/>
+            <a:ext cx="2351314" cy="369332"/>
+          </a:xfrm>
+          <a:prstGeom prst="rect">
+            <a:avLst/>
+          </a:prstGeom>
+          <a:noFill/>
+        </p:spPr>
+        <p:txBody>
+          <a:bodyPr wrap="square" rtlCol="0">
+            <a:spAutoFit/>
+          </a:bodyPr>
+          <a:lstStyle/>
+          <a:p>
+            <a:pPr algn="ctr"/>
+            <a:r>
+              <a:rPr lang="en-US" i="1" dirty="0"/>
+              <a:t>12 February 2021</a:t>
+            </a:r>
+          </a:p>
+        </p:txBody>
+      </p:sp>
+      <p:cxnSp>
+        <p:nvCxnSpPr>
+          <p:cNvPr id="17" name="Straight Connector 16">
+            <a:extLst>
+              <a:ext uri="{FF2B5EF4-FFF2-40B4-BE49-F238E27FC236}">
+                <a16:creationId xmlns:a16="http://schemas.microsoft.com/office/drawing/2014/main" id="{F7D477A2-CB1B-0546-B18F-EBFA2D68D586}"/>
+              </a:ext>
+            </a:extLst>
+          </p:cNvPr>
+          <p:cNvCxnSpPr>
+            <a:cxnSpLocks/>
+            <a:stCxn id="6" idx="2"/>
+            <a:endCxn id="16" idx="0"/>
+          </p:cNvCxnSpPr>
+          <p:nvPr/>
+        </p:nvCxnSpPr>
+        <p:spPr>
+          <a:xfrm>
+            <a:off x="3693226" y="4940135"/>
+            <a:ext cx="0" cy="102918"/>
+          </a:xfrm>
+          <a:prstGeom prst="line">
+            <a:avLst/>
+          </a:prstGeom>
+          <a:ln w="76200">
+            <a:solidFill>
+              <a:schemeClr val="tx1"/>
+            </a:solidFill>
+          </a:ln>
+        </p:spPr>
+        <p:style>
+          <a:lnRef idx="1">
+            <a:schemeClr val="accent1"/>
+          </a:lnRef>
+          <a:fillRef idx="0">
+            <a:schemeClr val="accent1"/>
+          </a:fillRef>
+          <a:effectRef idx="0">
+            <a:schemeClr val="accent1"/>
+          </a:effectRef>
+          <a:fontRef idx="minor">
+            <a:schemeClr val="tx1"/>
+          </a:fontRef>
+        </p:style>
+      </p:cxnSp>
     </p:spTree>
     <p:extLst>
       <p:ext uri="{BB962C8B-B14F-4D97-AF65-F5344CB8AC3E}">

</xml_diff>